<commit_message>
Minor changes in resource objects diagram
</commit_message>
<xml_diff>
--- a/Documentation/DD-API-2.0-resource-objects.pptx
+++ b/Documentation/DD-API-2.0-resource-objects.pptx
@@ -9504,7 +9504,15 @@
                     <a:schemeClr val="tx1"/>
                   </a:solidFill>
                 </a:rPr>
-                <a:t>Properties:</a:t>
+                <a:t>p</a:t>
+              </a:r>
+              <a:r>
+                <a:rPr lang="en-US" sz="800" dirty="0" smtClean="0">
+                  <a:solidFill>
+                    <a:schemeClr val="tx1"/>
+                  </a:solidFill>
+                </a:rPr>
+                <a:t>roperties:</a:t>
               </a:r>
               <a:endParaRPr lang="en-GB" sz="800" dirty="0">
                 <a:solidFill>
@@ -9562,20 +9570,12 @@
                 <a:t>type:  </a:t>
               </a:r>
               <a:r>
-                <a:rPr lang="en-US" sz="700" dirty="0">
-                  <a:solidFill>
-                    <a:schemeClr val="tx1"/>
-                  </a:solidFill>
-                </a:rPr>
-                <a:t>(</a:t>
-              </a:r>
-              <a:r>
                 <a:rPr lang="en-US" sz="700" dirty="0" smtClean="0">
                   <a:solidFill>
                     <a:schemeClr val="tx1"/>
                   </a:solidFill>
                 </a:rPr>
-                <a:t>Multi)Point</a:t>
+                <a:t>(Multi)Point</a:t>
               </a:r>
               <a:endParaRPr lang="en-GB" sz="700" dirty="0">
                 <a:solidFill>
@@ -9746,17 +9746,7 @@
                     </a:schemeClr>
                   </a:solidFill>
                 </a:rPr>
-                <a:t>displayName</a:t>
-              </a:r>
-              <a:r>
-                <a:rPr lang="en-US" sz="800" i="1" dirty="0" smtClean="0">
-                  <a:solidFill>
-                    <a:schemeClr val="bg1">
-                      <a:lumMod val="50000"/>
-                    </a:schemeClr>
-                  </a:solidFill>
-                </a:rPr>
-                <a:t>(…)</a:t>
+                <a:t>displayName(…)</a:t>
               </a:r>
               <a:endParaRPr lang="en-GB" sz="800" i="1" dirty="0">
                 <a:solidFill>

</xml_diff>